<commit_message>
P2 NB and slides
</commit_message>
<xml_diff>
--- a/slides/P3_EESCGU4220_Equations_2023.pptx
+++ b/slides/P3_EESCGU4220_Equations_2023.pptx
@@ -5574,21 +5574,7 @@
                 <a:latin typeface="Times New Roman" panose="02020603050405020304" pitchFamily="18" charset="0"/>
                 <a:cs typeface="Times New Roman" panose="02020603050405020304" pitchFamily="18" charset="0"/>
               </a:rPr>
-              <a:t>2. Compute it numerically using </a:t>
-            </a:r>
-            <a:r>
-              <a:rPr lang="en-US">
-                <a:latin typeface="Times New Roman" panose="02020603050405020304" pitchFamily="18" charset="0"/>
-                <a:cs typeface="Times New Roman" panose="02020603050405020304" pitchFamily="18" charset="0"/>
-              </a:rPr>
-              <a:t>the finite-difference </a:t>
-            </a:r>
-            <a:r>
-              <a:rPr lang="en-US" dirty="0">
-                <a:latin typeface="Times New Roman" panose="02020603050405020304" pitchFamily="18" charset="0"/>
-                <a:cs typeface="Times New Roman" panose="02020603050405020304" pitchFamily="18" charset="0"/>
-              </a:rPr>
-              <a:t>approximation:</a:t>
+              <a:t>2. Compute it numerically using the finite-difference approximation:</a:t>
             </a:r>
           </a:p>
           <a:p>

</xml_diff>